<commit_message>
reconstrut the Feature encoder
</commit_message>
<xml_diff>
--- a/images/MgRL_CE_Images.pptx
+++ b/images/MgRL_CE_Images.pptx
@@ -263,7 +263,7 @@
           <a:p>
             <a:fld id="{33CED4F4-8C16-E840-8EAB-9D4457026F8E}" type="datetimeFigureOut">
               <a:rPr lang="en-CN" smtClean="0"/>
-              <a:t>2024/4/9</a:t>
+              <a:t>2024/4/10</a:t>
             </a:fld>
             <a:endParaRPr lang="en-CN"/>
           </a:p>
@@ -463,7 +463,7 @@
           <a:p>
             <a:fld id="{33CED4F4-8C16-E840-8EAB-9D4457026F8E}" type="datetimeFigureOut">
               <a:rPr lang="en-CN" smtClean="0"/>
-              <a:t>2024/4/9</a:t>
+              <a:t>2024/4/10</a:t>
             </a:fld>
             <a:endParaRPr lang="en-CN"/>
           </a:p>
@@ -673,7 +673,7 @@
           <a:p>
             <a:fld id="{33CED4F4-8C16-E840-8EAB-9D4457026F8E}" type="datetimeFigureOut">
               <a:rPr lang="en-CN" smtClean="0"/>
-              <a:t>2024/4/9</a:t>
+              <a:t>2024/4/10</a:t>
             </a:fld>
             <a:endParaRPr lang="en-CN"/>
           </a:p>
@@ -873,7 +873,7 @@
           <a:p>
             <a:fld id="{33CED4F4-8C16-E840-8EAB-9D4457026F8E}" type="datetimeFigureOut">
               <a:rPr lang="en-CN" smtClean="0"/>
-              <a:t>2024/4/9</a:t>
+              <a:t>2024/4/10</a:t>
             </a:fld>
             <a:endParaRPr lang="en-CN"/>
           </a:p>
@@ -1149,7 +1149,7 @@
           <a:p>
             <a:fld id="{33CED4F4-8C16-E840-8EAB-9D4457026F8E}" type="datetimeFigureOut">
               <a:rPr lang="en-CN" smtClean="0"/>
-              <a:t>2024/4/9</a:t>
+              <a:t>2024/4/10</a:t>
             </a:fld>
             <a:endParaRPr lang="en-CN"/>
           </a:p>
@@ -1417,7 +1417,7 @@
           <a:p>
             <a:fld id="{33CED4F4-8C16-E840-8EAB-9D4457026F8E}" type="datetimeFigureOut">
               <a:rPr lang="en-CN" smtClean="0"/>
-              <a:t>2024/4/9</a:t>
+              <a:t>2024/4/10</a:t>
             </a:fld>
             <a:endParaRPr lang="en-CN"/>
           </a:p>
@@ -1832,7 +1832,7 @@
           <a:p>
             <a:fld id="{33CED4F4-8C16-E840-8EAB-9D4457026F8E}" type="datetimeFigureOut">
               <a:rPr lang="en-CN" smtClean="0"/>
-              <a:t>2024/4/9</a:t>
+              <a:t>2024/4/10</a:t>
             </a:fld>
             <a:endParaRPr lang="en-CN"/>
           </a:p>
@@ -1974,7 +1974,7 @@
           <a:p>
             <a:fld id="{33CED4F4-8C16-E840-8EAB-9D4457026F8E}" type="datetimeFigureOut">
               <a:rPr lang="en-CN" smtClean="0"/>
-              <a:t>2024/4/9</a:t>
+              <a:t>2024/4/10</a:t>
             </a:fld>
             <a:endParaRPr lang="en-CN"/>
           </a:p>
@@ -2087,7 +2087,7 @@
           <a:p>
             <a:fld id="{33CED4F4-8C16-E840-8EAB-9D4457026F8E}" type="datetimeFigureOut">
               <a:rPr lang="en-CN" smtClean="0"/>
-              <a:t>2024/4/9</a:t>
+              <a:t>2024/4/10</a:t>
             </a:fld>
             <a:endParaRPr lang="en-CN"/>
           </a:p>
@@ -2400,7 +2400,7 @@
           <a:p>
             <a:fld id="{33CED4F4-8C16-E840-8EAB-9D4457026F8E}" type="datetimeFigureOut">
               <a:rPr lang="en-CN" smtClean="0"/>
-              <a:t>2024/4/9</a:t>
+              <a:t>2024/4/10</a:t>
             </a:fld>
             <a:endParaRPr lang="en-CN"/>
           </a:p>
@@ -2689,7 +2689,7 @@
           <a:p>
             <a:fld id="{33CED4F4-8C16-E840-8EAB-9D4457026F8E}" type="datetimeFigureOut">
               <a:rPr lang="en-CN" smtClean="0"/>
-              <a:t>2024/4/9</a:t>
+              <a:t>2024/4/10</a:t>
             </a:fld>
             <a:endParaRPr lang="en-CN"/>
           </a:p>
@@ -2932,7 +2932,7 @@
           <a:p>
             <a:fld id="{33CED4F4-8C16-E840-8EAB-9D4457026F8E}" type="datetimeFigureOut">
               <a:rPr lang="en-CN" smtClean="0"/>
-              <a:t>2024/4/9</a:t>
+              <a:t>2024/4/10</a:t>
             </a:fld>
             <a:endParaRPr lang="en-CN"/>
           </a:p>
@@ -6881,8 +6881,8 @@
             </a:p>
           </p:txBody>
         </p:sp>
-        <mc:AlternateContent xmlns:mc="http://schemas.openxmlformats.org/markup-compatibility/2006" xmlns:a14="http://schemas.microsoft.com/office/drawing/2010/main">
-          <mc:Choice Requires="a14">
+        <mc:AlternateContent xmlns:mc="http://schemas.openxmlformats.org/markup-compatibility/2006">
+          <mc:Choice xmlns:a14="http://schemas.microsoft.com/office/drawing/2010/main" Requires="a14">
             <p:sp>
               <p:nvSpPr>
                 <p:cNvPr id="193" name="TextBox 192">
@@ -6936,13 +6936,10 @@
                           </m:e>
                           <m:sup>
                             <m:r>
-                              <m:rPr>
-                                <m:sty m:val="p"/>
-                              </m:rPr>
-                              <a:rPr lang="en-US" sz="1400" b="0" i="0">
+                              <a:rPr lang="en-US" sz="1400" b="0" i="1">
                                 <a:latin typeface="Cambria Math" panose="02040503050406030204" pitchFamily="18" charset="0"/>
                               </a:rPr>
-                              <m:t>G</m:t>
+                              <m:t>𝐺</m:t>
                             </m:r>
                           </m:sup>
                         </m:sSup>
@@ -7005,14 +7002,11 @@
                               </m:e>
                               <m:sup>
                                 <m:r>
-                                  <m:rPr>
-                                    <m:sty m:val="p"/>
-                                  </m:rPr>
-                                  <a:rPr lang="en-US" sz="1400" b="0" i="0" smtClean="0">
+                                  <a:rPr lang="en-US" sz="1400" b="0" i="1" smtClean="0">
                                     <a:latin typeface="Cambria Math" panose="02040503050406030204" pitchFamily="18" charset="0"/>
                                     <a:ea typeface="Cambria Math" panose="02040503050406030204" pitchFamily="18" charset="0"/>
                                   </a:rPr>
-                                  <m:t>G</m:t>
+                                  <m:t>𝐺</m:t>
                                 </m:r>
                               </m:sup>
                             </m:sSup>
@@ -7040,7 +7034,7 @@
               </p:txBody>
             </p:sp>
           </mc:Choice>
-          <mc:Fallback xmlns="">
+          <mc:Fallback>
             <p:sp>
               <p:nvSpPr>
                 <p:cNvPr id="193" name="TextBox 192">
@@ -7066,7 +7060,7 @@
                 <a:blipFill>
                   <a:blip r:embed="rId13"/>
                   <a:stretch>
-                    <a:fillRect l="-3261" b="-4762"/>
+                    <a:fillRect l="-3261" r="-1087" b="-4762"/>
                   </a:stretch>
                 </a:blipFill>
               </p:spPr>
@@ -7270,8 +7264,8 @@
             <a:effectLst/>
           </p:spPr>
         </p:cxnSp>
-        <mc:AlternateContent xmlns:mc="http://schemas.openxmlformats.org/markup-compatibility/2006" xmlns:a14="http://schemas.microsoft.com/office/drawing/2010/main">
-          <mc:Choice Requires="a14">
+        <mc:AlternateContent xmlns:mc="http://schemas.openxmlformats.org/markup-compatibility/2006">
+          <mc:Choice xmlns:a14="http://schemas.microsoft.com/office/drawing/2010/main" Requires="a14">
             <p:sp>
               <p:nvSpPr>
                 <p:cNvPr id="240" name="TextBox 239">
@@ -7325,19 +7319,22 @@
                           </m:e>
                           <m:sup>
                             <m:r>
-                              <m:rPr>
-                                <m:sty m:val="p"/>
-                              </m:rPr>
-                              <a:rPr lang="en-US" altLang="zh-CN" sz="1400" b="0" i="0" smtClean="0">
+                              <a:rPr lang="en-US" altLang="zh-CN" sz="1400" b="0" i="1" smtClean="0">
                                 <a:latin typeface="Cambria Math" panose="02040503050406030204" pitchFamily="18" charset="0"/>
                               </a:rPr>
-                              <m:t>G</m:t>
+                              <m:t>𝐺</m:t>
                             </m:r>
                             <m:r>
                               <a:rPr lang="en-US" altLang="zh-CN" sz="1400" b="0" i="0" smtClean="0">
                                 <a:latin typeface="Cambria Math" panose="02040503050406030204" pitchFamily="18" charset="0"/>
                               </a:rPr>
-                              <m:t>−1</m:t>
+                              <m:t>−</m:t>
+                            </m:r>
+                            <m:r>
+                              <a:rPr lang="en-US" altLang="zh-CN" sz="1400" b="0" i="1" smtClean="0">
+                                <a:latin typeface="Cambria Math" panose="02040503050406030204" pitchFamily="18" charset="0"/>
+                              </a:rPr>
+                              <m:t>1</m:t>
                             </m:r>
                           </m:sup>
                         </m:sSup>
@@ -7349,7 +7346,7 @@
               </p:txBody>
             </p:sp>
           </mc:Choice>
-          <mc:Fallback xmlns="">
+          <mc:Fallback>
             <p:sp>
               <p:nvSpPr>
                 <p:cNvPr id="240" name="TextBox 239">
@@ -7375,7 +7372,7 @@
                 <a:blipFill>
                   <a:blip r:embed="rId14"/>
                   <a:stretch>
-                    <a:fillRect l="-8824" r="-2941" b="-5556"/>
+                    <a:fillRect l="-8571" r="-2857"/>
                   </a:stretch>
                 </a:blipFill>
               </p:spPr>
@@ -7778,8 +7775,8 @@
             </p:sp>
           </mc:Fallback>
         </mc:AlternateContent>
-        <mc:AlternateContent xmlns:mc="http://schemas.openxmlformats.org/markup-compatibility/2006" xmlns:a14="http://schemas.microsoft.com/office/drawing/2010/main">
-          <mc:Choice Requires="a14">
+        <mc:AlternateContent xmlns:mc="http://schemas.openxmlformats.org/markup-compatibility/2006">
+          <mc:Choice xmlns:a14="http://schemas.microsoft.com/office/drawing/2010/main" Requires="a14">
             <p:sp>
               <p:nvSpPr>
                 <p:cNvPr id="261" name="TextBox 260">
@@ -7833,13 +7830,10 @@
                           </m:e>
                           <m:sup>
                             <m:r>
-                              <m:rPr>
-                                <m:sty m:val="p"/>
-                              </m:rPr>
                               <a:rPr lang="en-US" sz="1400" i="1">
                                 <a:latin typeface="Cambria Math" panose="02040503050406030204" pitchFamily="18" charset="0"/>
                               </a:rPr>
-                              <m:t>G</m:t>
+                              <m:t>𝐺</m:t>
                             </m:r>
                           </m:sup>
                         </m:sSup>
@@ -7851,7 +7845,7 @@
               </p:txBody>
             </p:sp>
           </mc:Choice>
-          <mc:Fallback xmlns="">
+          <mc:Fallback>
             <p:sp>
               <p:nvSpPr>
                 <p:cNvPr id="261" name="TextBox 260">
@@ -7877,7 +7871,7 @@
                 <a:blipFill>
                   <a:blip r:embed="rId16"/>
                   <a:stretch>
-                    <a:fillRect l="-14286" r="-4762" b="-11111"/>
+                    <a:fillRect l="-14286" b="-5556"/>
                   </a:stretch>
                 </a:blipFill>
               </p:spPr>
@@ -8812,8 +8806,8 @@
             <a:effectLst/>
           </p:spPr>
         </p:cxnSp>
-        <mc:AlternateContent xmlns:mc="http://schemas.openxmlformats.org/markup-compatibility/2006" xmlns:a14="http://schemas.microsoft.com/office/drawing/2010/main">
-          <mc:Choice Requires="a14">
+        <mc:AlternateContent xmlns:mc="http://schemas.openxmlformats.org/markup-compatibility/2006">
+          <mc:Choice xmlns:a14="http://schemas.microsoft.com/office/drawing/2010/main" Requires="a14">
             <p:sp>
               <p:nvSpPr>
                 <p:cNvPr id="363" name="Rounded Rectangle 362">
@@ -8924,6 +8918,16 @@
                               <a:latin typeface="Cambria Math" panose="02040503050406030204" pitchFamily="18" charset="0"/>
                               <a:ea typeface="Cambria Math" panose="02040503050406030204" pitchFamily="18" charset="0"/>
                             </a:rPr>
+                            <m:t>T</m:t>
+                          </m:r>
+                          <m:r>
+                            <m:rPr>
+                              <m:sty m:val="p"/>
+                            </m:rPr>
+                            <a:rPr lang="en-US" sz="1400" b="0" i="0" smtClean="0">
+                              <a:latin typeface="Cambria Math" panose="02040503050406030204" pitchFamily="18" charset="0"/>
+                              <a:ea typeface="Cambria Math" panose="02040503050406030204" pitchFamily="18" charset="0"/>
+                            </a:rPr>
                             <m:t>Enc</m:t>
                           </m:r>
                         </m:sub>
@@ -8957,7 +8961,7 @@
               </p:txBody>
             </p:sp>
           </mc:Choice>
-          <mc:Fallback xmlns="">
+          <mc:Fallback>
             <p:sp>
               <p:nvSpPr>
                 <p:cNvPr id="363" name="Rounded Rectangle 362">
@@ -11113,8 +11117,8 @@
           <a:effectLst/>
         </p:spPr>
       </p:cxnSp>
-      <mc:AlternateContent xmlns:mc="http://schemas.openxmlformats.org/markup-compatibility/2006">
-        <mc:Choice xmlns:a14="http://schemas.microsoft.com/office/drawing/2010/main" Requires="a14">
+      <mc:AlternateContent xmlns:mc="http://schemas.openxmlformats.org/markup-compatibility/2006" xmlns:a14="http://schemas.microsoft.com/office/drawing/2010/main">
+        <mc:Choice Requires="a14">
           <p:sp>
             <p:nvSpPr>
               <p:cNvPr id="9" name="TextBox 8">
@@ -11219,7 +11223,7 @@
             </p:txBody>
           </p:sp>
         </mc:Choice>
-        <mc:Fallback>
+        <mc:Fallback xmlns="">
           <p:sp>
             <p:nvSpPr>
               <p:cNvPr id="9" name="TextBox 8">
@@ -11299,8 +11303,8 @@
           <a:effectLst/>
         </p:spPr>
       </p:cxnSp>
-      <mc:AlternateContent xmlns:mc="http://schemas.openxmlformats.org/markup-compatibility/2006">
-        <mc:Choice xmlns:a14="http://schemas.microsoft.com/office/drawing/2010/main" Requires="a14">
+      <mc:AlternateContent xmlns:mc="http://schemas.openxmlformats.org/markup-compatibility/2006" xmlns:a14="http://schemas.microsoft.com/office/drawing/2010/main">
+        <mc:Choice Requires="a14">
           <p:sp>
             <p:nvSpPr>
               <p:cNvPr id="14" name="TextBox 13">
@@ -11369,7 +11373,7 @@
             </p:txBody>
           </p:sp>
         </mc:Choice>
-        <mc:Fallback>
+        <mc:Fallback xmlns="">
           <p:sp>
             <p:nvSpPr>
               <p:cNvPr id="14" name="TextBox 13">
@@ -11483,8 +11487,8 @@
           </a:p>
         </p:txBody>
       </p:sp>
-      <mc:AlternateContent xmlns:mc="http://schemas.openxmlformats.org/markup-compatibility/2006">
-        <mc:Choice xmlns:a14="http://schemas.microsoft.com/office/drawing/2010/main" Requires="a14">
+      <mc:AlternateContent xmlns:mc="http://schemas.openxmlformats.org/markup-compatibility/2006" xmlns:a14="http://schemas.microsoft.com/office/drawing/2010/main">
+        <mc:Choice Requires="a14">
           <p:sp>
             <p:nvSpPr>
               <p:cNvPr id="12" name="TextBox 11">
@@ -11553,7 +11557,7 @@
             </p:txBody>
           </p:sp>
         </mc:Choice>
-        <mc:Fallback>
+        <mc:Fallback xmlns="">
           <p:sp>
             <p:nvSpPr>
               <p:cNvPr id="12" name="TextBox 11">
@@ -11710,6 +11714,16 @@
                             <a:latin typeface="Cambria Math" panose="02040503050406030204" pitchFamily="18" charset="0"/>
                             <a:ea typeface="Cambria Math" panose="02040503050406030204" pitchFamily="18" charset="0"/>
                           </a:rPr>
+                          <m:t>T</m:t>
+                        </m:r>
+                        <m:r>
+                          <m:rPr>
+                            <m:sty m:val="p"/>
+                          </m:rPr>
+                          <a:rPr lang="en-US" sz="1400" b="0" i="0" smtClean="0">
+                            <a:latin typeface="Cambria Math" panose="02040503050406030204" pitchFamily="18" charset="0"/>
+                            <a:ea typeface="Cambria Math" panose="02040503050406030204" pitchFamily="18" charset="0"/>
+                          </a:rPr>
                           <m:t>Enc</m:t>
                         </m:r>
                       </m:sub>
@@ -11804,8 +11818,8 @@
           </p:sp>
         </mc:Fallback>
       </mc:AlternateContent>
-      <mc:AlternateContent xmlns:mc="http://schemas.openxmlformats.org/markup-compatibility/2006">
-        <mc:Choice xmlns:a14="http://schemas.microsoft.com/office/drawing/2010/main" Requires="a14">
+      <mc:AlternateContent xmlns:mc="http://schemas.openxmlformats.org/markup-compatibility/2006" xmlns:a14="http://schemas.microsoft.com/office/drawing/2010/main">
+        <mc:Choice Requires="a14">
           <p:sp>
             <p:nvSpPr>
               <p:cNvPr id="4" name="Rounded Rectangle 3">
@@ -11942,7 +11956,7 @@
             </p:txBody>
           </p:sp>
         </mc:Choice>
-        <mc:Fallback>
+        <mc:Fallback xmlns="">
           <p:sp>
             <p:nvSpPr>
               <p:cNvPr id="4" name="Rounded Rectangle 3">
@@ -12003,8 +12017,8 @@
           </p:sp>
         </mc:Fallback>
       </mc:AlternateContent>
-      <mc:AlternateContent xmlns:mc="http://schemas.openxmlformats.org/markup-compatibility/2006">
-        <mc:Choice xmlns:a14="http://schemas.microsoft.com/office/drawing/2010/main" Requires="a14">
+      <mc:AlternateContent xmlns:mc="http://schemas.openxmlformats.org/markup-compatibility/2006" xmlns:a14="http://schemas.microsoft.com/office/drawing/2010/main">
+        <mc:Choice Requires="a14">
           <p:sp>
             <p:nvSpPr>
               <p:cNvPr id="5" name="Rounded Rectangle 4">
@@ -12141,7 +12155,7 @@
             </p:txBody>
           </p:sp>
         </mc:Choice>
-        <mc:Fallback>
+        <mc:Fallback xmlns="">
           <p:sp>
             <p:nvSpPr>
               <p:cNvPr id="5" name="Rounded Rectangle 4">
@@ -12277,8 +12291,8 @@
           <a:effectLst/>
         </p:spPr>
       </p:cxnSp>
-      <mc:AlternateContent xmlns:mc="http://schemas.openxmlformats.org/markup-compatibility/2006">
-        <mc:Choice xmlns:a14="http://schemas.microsoft.com/office/drawing/2010/main" Requires="a14">
+      <mc:AlternateContent xmlns:mc="http://schemas.openxmlformats.org/markup-compatibility/2006" xmlns:a14="http://schemas.microsoft.com/office/drawing/2010/main">
+        <mc:Choice Requires="a14">
           <p:sp>
             <p:nvSpPr>
               <p:cNvPr id="11" name="TextBox 10">
@@ -12347,7 +12361,7 @@
             </p:txBody>
           </p:sp>
         </mc:Choice>
-        <mc:Fallback>
+        <mc:Fallback xmlns="">
           <p:sp>
             <p:nvSpPr>
               <p:cNvPr id="11" name="TextBox 10">
@@ -14784,8 +14798,8 @@
           </a:p>
         </p:txBody>
       </p:sp>
-      <mc:AlternateContent xmlns:mc="http://schemas.openxmlformats.org/markup-compatibility/2006">
-        <mc:Choice xmlns:a14="http://schemas.microsoft.com/office/drawing/2010/main" Requires="a14">
+      <mc:AlternateContent xmlns:mc="http://schemas.openxmlformats.org/markup-compatibility/2006" xmlns:a14="http://schemas.microsoft.com/office/drawing/2010/main">
+        <mc:Choice Requires="a14">
           <p:sp>
             <p:nvSpPr>
               <p:cNvPr id="224" name="TextBox 223">
@@ -14945,7 +14959,7 @@
             </p:txBody>
           </p:sp>
         </mc:Choice>
-        <mc:Fallback>
+        <mc:Fallback xmlns="">
           <p:sp>
             <p:nvSpPr>
               <p:cNvPr id="224" name="TextBox 223">

</xml_diff>